<commit_message>
Fixed pp (hd, tl, aff multiple)
</commit_message>
<xml_diff>
--- a/Documents/Présentation/Presentation 10-01-17.pptx
+++ b/Documents/Présentation/Presentation 10-01-17.pptx
@@ -2598,8 +2598,8 @@
         </p:nvSpPr>
         <p:spPr>
           <a:xfrm>
-            <a:off x="589032" y="3166723"/>
-            <a:ext cx="5682980" cy="461665"/>
+            <a:off x="576152" y="1739152"/>
+            <a:ext cx="8067786" cy="461665"/>
           </a:xfrm>
           <a:prstGeom prst="rect">
             <a:avLst/>
@@ -2621,14 +2621,7 @@
                 <a:latin typeface="Segoe UI Semilight" panose="020B0402040204020203" pitchFamily="34" charset="0"/>
                 <a:cs typeface="Segoe UI Semilight" panose="020B0402040204020203" pitchFamily="34" charset="0"/>
               </a:rPr>
-              <a:t>For et </a:t>
-            </a:r>
-            <a:r>
-              <a:rPr lang="fr-FR" sz="2400" dirty="0" err="1" smtClean="0">
-                <a:latin typeface="Segoe UI Semilight" panose="020B0402040204020203" pitchFamily="34" charset="0"/>
-                <a:cs typeface="Segoe UI Semilight" panose="020B0402040204020203" pitchFamily="34" charset="0"/>
-              </a:rPr>
-              <a:t>ForEach</a:t>
+              <a:t>Correction bug avec des appels multiples de fonctions</a:t>
             </a:r>
             <a:endParaRPr lang="fr-FR" sz="2400" dirty="0" smtClean="0">
               <a:latin typeface="Segoe UI Semilight" panose="020B0402040204020203" pitchFamily="34" charset="0"/>
@@ -2639,76 +2632,13 @@
       </p:sp>
       <p:sp>
         <p:nvSpPr>
-          <p:cNvPr id="8" name="ZoneTexte 7"/>
-          <p:cNvSpPr txBox="1"/>
-          <p:nvPr/>
-        </p:nvSpPr>
-        <p:spPr>
-          <a:xfrm>
-            <a:off x="189025" y="1228037"/>
-            <a:ext cx="3412902" cy="461665"/>
-          </a:xfrm>
-          <a:prstGeom prst="rect">
-            <a:avLst/>
-          </a:prstGeom>
-          <a:noFill/>
-        </p:spPr>
-        <p:txBody>
-          <a:bodyPr wrap="square" rtlCol="0">
-            <a:spAutoFit/>
-          </a:bodyPr>
-          <a:lstStyle/>
-          <a:p>
-            <a:r>
-              <a:rPr lang="fr-FR" sz="2400" u="sng" dirty="0" smtClean="0">
-                <a:latin typeface="Segoe UI Semilight" panose="020B0402040204020203" pitchFamily="34" charset="0"/>
-                <a:cs typeface="Segoe UI Semilight" panose="020B0402040204020203" pitchFamily="34" charset="0"/>
-              </a:rPr>
-              <a:t>Table des symboles</a:t>
-            </a:r>
-          </a:p>
-        </p:txBody>
-      </p:sp>
-      <p:sp>
-        <p:nvSpPr>
-          <p:cNvPr id="4" name="Rectangle 3"/>
-          <p:cNvSpPr/>
-          <p:nvPr/>
-        </p:nvSpPr>
-        <p:spPr>
-          <a:xfrm>
-            <a:off x="589032" y="1846431"/>
-            <a:ext cx="7856381" cy="461665"/>
-          </a:xfrm>
-          <a:prstGeom prst="rect">
-            <a:avLst/>
-          </a:prstGeom>
-        </p:spPr>
-        <p:txBody>
-          <a:bodyPr wrap="none">
-            <a:spAutoFit/>
-          </a:bodyPr>
-          <a:lstStyle/>
-          <a:p>
-            <a:r>
-              <a:rPr lang="fr-FR" sz="2400" dirty="0">
-                <a:latin typeface="Segoe UI Semilight" panose="020B0402040204020203" pitchFamily="34" charset="0"/>
-                <a:cs typeface="Segoe UI Semilight" panose="020B0402040204020203" pitchFamily="34" charset="0"/>
-              </a:rPr>
-              <a:t>- Vérification du nombre d’output dans l’appel de fonction</a:t>
-            </a:r>
-          </a:p>
-        </p:txBody>
-      </p:sp>
-      <p:sp>
-        <p:nvSpPr>
           <p:cNvPr id="9" name="ZoneTexte 8"/>
           <p:cNvSpPr txBox="1"/>
           <p:nvPr/>
         </p:nvSpPr>
         <p:spPr>
           <a:xfrm>
-            <a:off x="189025" y="2658892"/>
+            <a:off x="176145" y="1235075"/>
             <a:ext cx="3412902" cy="461665"/>
           </a:xfrm>
           <a:prstGeom prst="rect">
@@ -2740,7 +2670,7 @@
         </p:nvSpPr>
         <p:spPr>
           <a:xfrm>
-            <a:off x="576152" y="4256182"/>
+            <a:off x="576152" y="2874776"/>
             <a:ext cx="7009504" cy="461665"/>
           </a:xfrm>
           <a:prstGeom prst="rect">
@@ -2776,7 +2706,7 @@
         </p:nvSpPr>
         <p:spPr>
           <a:xfrm>
-            <a:off x="176145" y="3748351"/>
+            <a:off x="176145" y="2366945"/>
             <a:ext cx="3412902" cy="461665"/>
           </a:xfrm>
           <a:prstGeom prst="rect">
@@ -2797,6 +2727,82 @@
               </a:rPr>
               <a:t>Tests</a:t>
             </a:r>
+          </a:p>
+        </p:txBody>
+      </p:sp>
+      <p:sp>
+        <p:nvSpPr>
+          <p:cNvPr id="12" name="ZoneTexte 11"/>
+          <p:cNvSpPr txBox="1"/>
+          <p:nvPr/>
+        </p:nvSpPr>
+        <p:spPr>
+          <a:xfrm>
+            <a:off x="576151" y="3986096"/>
+            <a:ext cx="8839311" cy="461665"/>
+          </a:xfrm>
+          <a:prstGeom prst="rect">
+            <a:avLst/>
+          </a:prstGeom>
+          <a:noFill/>
+        </p:spPr>
+        <p:txBody>
+          <a:bodyPr wrap="square" rtlCol="0">
+            <a:spAutoFit/>
+          </a:bodyPr>
+          <a:lstStyle/>
+          <a:p>
+            <a:pPr marL="342900" indent="-342900">
+              <a:buFontTx/>
+              <a:buChar char="-"/>
+            </a:pPr>
+            <a:r>
+              <a:rPr lang="fr-FR" sz="2400" dirty="0" smtClean="0">
+                <a:latin typeface="Segoe UI Semilight" panose="020B0402040204020203" pitchFamily="34" charset="0"/>
+                <a:cs typeface="Segoe UI Semilight" panose="020B0402040204020203" pitchFamily="34" charset="0"/>
+              </a:rPr>
+              <a:t>Correction bug de l’exécution du code généré</a:t>
+            </a:r>
+            <a:endParaRPr lang="fr-FR" sz="2400" dirty="0" smtClean="0">
+              <a:latin typeface="Segoe UI Semilight" panose="020B0402040204020203" pitchFamily="34" charset="0"/>
+              <a:cs typeface="Segoe UI Semilight" panose="020B0402040204020203" pitchFamily="34" charset="0"/>
+            </a:endParaRPr>
+          </a:p>
+        </p:txBody>
+      </p:sp>
+      <p:sp>
+        <p:nvSpPr>
+          <p:cNvPr id="13" name="ZoneTexte 12"/>
+          <p:cNvSpPr txBox="1"/>
+          <p:nvPr/>
+        </p:nvSpPr>
+        <p:spPr>
+          <a:xfrm>
+            <a:off x="176145" y="3482019"/>
+            <a:ext cx="3412902" cy="461665"/>
+          </a:xfrm>
+          <a:prstGeom prst="rect">
+            <a:avLst/>
+          </a:prstGeom>
+          <a:noFill/>
+        </p:spPr>
+        <p:txBody>
+          <a:bodyPr wrap="square" rtlCol="0">
+            <a:spAutoFit/>
+          </a:bodyPr>
+          <a:lstStyle/>
+          <a:p>
+            <a:r>
+              <a:rPr lang="fr-FR" sz="2400" u="sng" dirty="0" smtClean="0">
+                <a:latin typeface="Segoe UI Semilight" panose="020B0402040204020203" pitchFamily="34" charset="0"/>
+                <a:cs typeface="Segoe UI Semilight" panose="020B0402040204020203" pitchFamily="34" charset="0"/>
+              </a:rPr>
+              <a:t>Script WHC</a:t>
+            </a:r>
+            <a:endParaRPr lang="fr-FR" sz="2400" u="sng" dirty="0" smtClean="0">
+              <a:latin typeface="Segoe UI Semilight" panose="020B0402040204020203" pitchFamily="34" charset="0"/>
+              <a:cs typeface="Segoe UI Semilight" panose="020B0402040204020203" pitchFamily="34" charset="0"/>
+            </a:endParaRPr>
           </a:p>
         </p:txBody>
       </p:sp>

</xml_diff>